<commit_message>
Modify the sample of 07
</commit_message>
<xml_diff>
--- a/PPT/07-Accenture-FS-Angular-Service.pptx
+++ b/PPT/07-Accenture-FS-Angular-Service.pptx
@@ -14,8 +14,8 @@
     <p:sldId id="259" r:id="rId5"/>
     <p:sldId id="443" r:id="rId6"/>
     <p:sldId id="379" r:id="rId7"/>
-    <p:sldId id="453" r:id="rId8"/>
-    <p:sldId id="454" r:id="rId9"/>
+    <p:sldId id="454" r:id="rId8"/>
+    <p:sldId id="453" r:id="rId9"/>
     <p:sldId id="463" r:id="rId10"/>
     <p:sldId id="457" r:id="rId11"/>
     <p:sldId id="464" r:id="rId12"/>
@@ -5640,7 +5640,7 @@
     </p:spTree>
     <p:extLst>
       <p:ext uri="{BB962C8B-B14F-4D97-AF65-F5344CB8AC3E}">
-        <p14:creationId xmlns:p14="http://schemas.microsoft.com/office/powerpoint/2010/main" val="3381227368"/>
+        <p14:creationId xmlns:p14="http://schemas.microsoft.com/office/powerpoint/2010/main" val="608724806"/>
       </p:ext>
     </p:extLst>
   </p:cSld>
@@ -6374,7 +6374,7 @@
     </p:spTree>
     <p:extLst>
       <p:ext uri="{BB962C8B-B14F-4D97-AF65-F5344CB8AC3E}">
-        <p14:creationId xmlns:p14="http://schemas.microsoft.com/office/powerpoint/2010/main" val="608724806"/>
+        <p14:creationId xmlns:p14="http://schemas.microsoft.com/office/powerpoint/2010/main" val="3381227368"/>
       </p:ext>
     </p:extLst>
   </p:cSld>
@@ -18072,14 +18072,57 @@
       </p:sp>
       <p:sp>
         <p:nvSpPr>
-          <p:cNvPr id="7" name="Rectangle 6"/>
+          <p:cNvPr id="13" name="Rectangle 12"/>
           <p:cNvSpPr/>
           <p:nvPr/>
         </p:nvSpPr>
         <p:spPr>
           <a:xfrm>
-            <a:off x="349643" y="2196213"/>
-            <a:ext cx="1560042" cy="369332"/>
+            <a:off x="461035" y="5656976"/>
+            <a:ext cx="9624430" cy="738664"/>
+          </a:xfrm>
+          <a:prstGeom prst="rect">
+            <a:avLst/>
+          </a:prstGeom>
+        </p:spPr>
+        <p:txBody>
+          <a:bodyPr wrap="square">
+            <a:spAutoFit/>
+          </a:bodyPr>
+          <a:lstStyle/>
+          <a:p>
+            <a:r>
+              <a:rPr lang="en-US" sz="1400" b="0" dirty="0">
+                <a:hlinkClick r:id="rId3"/>
+              </a:rPr>
+              <a:t>https://angular.io/guide/dependency-injection</a:t>
+            </a:r>
+            <a:endParaRPr lang="en-US" sz="1400" b="0" dirty="0"/>
+          </a:p>
+          <a:p>
+            <a:r>
+              <a:rPr lang="en-US" sz="1400" b="0" dirty="0">
+                <a:hlinkClick r:id="rId4"/>
+              </a:rPr>
+              <a:t>https://www.w3cschool.cn/angular/angular-l9oa24no.html</a:t>
+            </a:r>
+            <a:endParaRPr lang="en-US" sz="1400" b="0" dirty="0"/>
+          </a:p>
+          <a:p>
+            <a:endParaRPr lang="en-US" sz="1400" b="0" dirty="0"/>
+          </a:p>
+        </p:txBody>
+      </p:sp>
+      <p:sp>
+        <p:nvSpPr>
+          <p:cNvPr id="14" name="Rectangle 13"/>
+          <p:cNvSpPr/>
+          <p:nvPr/>
+        </p:nvSpPr>
+        <p:spPr>
+          <a:xfrm>
+            <a:off x="461035" y="1622311"/>
+            <a:ext cx="7802136" cy="3416320"/>
           </a:xfrm>
           <a:prstGeom prst="rect">
             <a:avLst/>
@@ -18091,40 +18134,9 @@
           </a:bodyPr>
           <a:lstStyle/>
           <a:p>
-            <a:r>
-              <a:rPr lang="en-US" sz="1800" b="0" i="1" dirty="0">
-                <a:latin typeface="Roboto"/>
-              </a:rPr>
-              <a:t>@Injectable()</a:t>
-            </a:r>
-            <a:endParaRPr lang="en-US" sz="1800" b="0" i="0" dirty="0">
-              <a:effectLst/>
-              <a:latin typeface="Roboto"/>
-            </a:endParaRPr>
-          </a:p>
-        </p:txBody>
-      </p:sp>
-      <p:sp>
-        <p:nvSpPr>
-          <p:cNvPr id="8" name="Rectangle 7"/>
-          <p:cNvSpPr/>
-          <p:nvPr/>
-        </p:nvSpPr>
-        <p:spPr>
-          <a:xfrm>
-            <a:off x="349643" y="1387064"/>
-            <a:ext cx="8063255" cy="646331"/>
-          </a:xfrm>
-          <a:prstGeom prst="rect">
-            <a:avLst/>
-          </a:prstGeom>
-        </p:spPr>
-        <p:txBody>
-          <a:bodyPr wrap="square">
-            <a:spAutoFit/>
-          </a:bodyPr>
-          <a:lstStyle/>
-          <a:p>
+            <a:pPr marL="342900" indent="-342900">
+              <a:buAutoNum type="arabicPeriod"/>
+            </a:pPr>
             <a:r>
               <a:rPr lang="en-US" sz="1800" b="0" dirty="0">
                 <a:latin typeface="SimSun" panose="02010600030101010101" pitchFamily="2" charset="-122"/>
@@ -18137,7 +18149,20 @@
                 <a:latin typeface="SimSun" panose="02010600030101010101" pitchFamily="2" charset="-122"/>
                 <a:ea typeface="SimSun" panose="02010600030101010101" pitchFamily="2" charset="-122"/>
               </a:rPr>
-              <a:t>有自己的依赖注入框架，该框架也可以作为一个单例模块供其他</a:t>
+              <a:t>有自己的依赖注入框架，该框架也可以作为一个单例模块供</a:t>
+            </a:r>
+            <a:endParaRPr lang="en-US" altLang="zh-CN" sz="1800" b="0" dirty="0">
+              <a:latin typeface="SimSun" panose="02010600030101010101" pitchFamily="2" charset="-122"/>
+              <a:ea typeface="SimSun" panose="02010600030101010101" pitchFamily="2" charset="-122"/>
+            </a:endParaRPr>
+          </a:p>
+          <a:p>
+            <a:r>
+              <a:rPr lang="zh-CN" altLang="en-US" sz="1800" b="0" dirty="0">
+                <a:latin typeface="SimSun" panose="02010600030101010101" pitchFamily="2" charset="-122"/>
+                <a:ea typeface="SimSun" panose="02010600030101010101" pitchFamily="2" charset="-122"/>
+              </a:rPr>
+              <a:t>其他</a:t>
             </a:r>
             <a:r>
               <a:rPr lang="en-US" altLang="zh-CN" sz="1800" b="0" dirty="0">
@@ -18153,193 +18178,244 @@
               </a:rPr>
               <a:t>或框架使用。</a:t>
             </a:r>
-            <a:endParaRPr lang="en-US" sz="1800" dirty="0">
+            <a:endParaRPr lang="en-US" altLang="zh-CN" sz="1800" b="0" dirty="0">
               <a:latin typeface="SimSun" panose="02010600030101010101" pitchFamily="2" charset="-122"/>
               <a:ea typeface="SimSun" panose="02010600030101010101" pitchFamily="2" charset="-122"/>
             </a:endParaRPr>
           </a:p>
-        </p:txBody>
-      </p:sp>
-      <p:pic>
-        <p:nvPicPr>
-          <p:cNvPr id="9" name="Picture 8"/>
-          <p:cNvPicPr>
-            <a:picLocks noChangeAspect="1"/>
-          </p:cNvPicPr>
-          <p:nvPr/>
-        </p:nvPicPr>
-        <p:blipFill>
-          <a:blip r:embed="rId3"/>
-          <a:stretch>
-            <a:fillRect/>
-          </a:stretch>
-        </p:blipFill>
-        <p:spPr>
-          <a:xfrm>
-            <a:off x="482746" y="3914079"/>
-            <a:ext cx="2820321" cy="1639433"/>
-          </a:xfrm>
-          <a:prstGeom prst="rect">
-            <a:avLst/>
-          </a:prstGeom>
-        </p:spPr>
-      </p:pic>
-      <p:pic>
-        <p:nvPicPr>
-          <p:cNvPr id="10" name="Picture 9"/>
-          <p:cNvPicPr>
-            <a:picLocks noChangeAspect="1"/>
-          </p:cNvPicPr>
-          <p:nvPr/>
-        </p:nvPicPr>
-        <p:blipFill>
-          <a:blip r:embed="rId4"/>
-          <a:stretch>
-            <a:fillRect/>
-          </a:stretch>
-        </p:blipFill>
-        <p:spPr>
-          <a:xfrm>
-            <a:off x="447510" y="2557156"/>
-            <a:ext cx="8159595" cy="1346026"/>
-          </a:xfrm>
-          <a:prstGeom prst="rect">
-            <a:avLst/>
-          </a:prstGeom>
-        </p:spPr>
-      </p:pic>
-      <p:sp>
-        <p:nvSpPr>
-          <p:cNvPr id="13" name="Rectangle 12"/>
-          <p:cNvSpPr/>
-          <p:nvPr/>
-        </p:nvSpPr>
-        <p:spPr>
-          <a:xfrm>
-            <a:off x="3447850" y="4090248"/>
-            <a:ext cx="5159256" cy="1077218"/>
-          </a:xfrm>
-          <a:prstGeom prst="rect">
-            <a:avLst/>
-          </a:prstGeom>
-        </p:spPr>
-        <p:txBody>
-          <a:bodyPr wrap="square">
-            <a:spAutoFit/>
-          </a:bodyPr>
-          <a:lstStyle/>
-          <a:p>
-            <a:r>
-              <a:rPr lang="zh-CN" altLang="en-US" sz="1600" b="0" dirty="0">
+          <a:p>
+            <a:r>
+              <a:rPr lang="en-US" altLang="zh-CN" sz="1800" b="0" dirty="0">
                 <a:latin typeface="SimSun" panose="02010600030101010101" pitchFamily="2" charset="-122"/>
                 <a:ea typeface="SimSun" panose="02010600030101010101" pitchFamily="2" charset="-122"/>
               </a:rPr>
-              <a:t>为什么我们的</a:t>
-            </a:r>
-            <a:r>
-              <a:rPr lang="en-US" altLang="zh-CN" sz="1600" b="0" dirty="0">
+              <a:t>2. </a:t>
+            </a:r>
+            <a:r>
+              <a:rPr lang="en-US" sz="1800" b="0" dirty="0">
                 <a:latin typeface="SimSun" panose="02010600030101010101" pitchFamily="2" charset="-122"/>
                 <a:ea typeface="SimSun" panose="02010600030101010101" pitchFamily="2" charset="-122"/>
               </a:rPr>
-              <a:t>Component</a:t>
-            </a:r>
-            <a:r>
-              <a:rPr lang="zh-CN" altLang="en-US" sz="1600" b="0" dirty="0">
+              <a:t>Angular2</a:t>
+            </a:r>
+            <a:r>
+              <a:rPr lang="zh-CN" altLang="en-US" sz="1800" b="0" dirty="0">
                 <a:latin typeface="SimSun" panose="02010600030101010101" pitchFamily="2" charset="-122"/>
                 <a:ea typeface="SimSun" panose="02010600030101010101" pitchFamily="2" charset="-122"/>
               </a:rPr>
-              <a:t>不需要加</a:t>
-            </a:r>
-            <a:r>
-              <a:rPr lang="en-US" altLang="zh-CN" sz="1600" b="0" dirty="0">
+              <a:t>中我们不需要自己配置</a:t>
+            </a:r>
+            <a:r>
+              <a:rPr lang="en-US" altLang="zh-CN" sz="1800" b="0" dirty="0">
                 <a:latin typeface="SimSun" panose="02010600030101010101" pitchFamily="2" charset="-122"/>
                 <a:ea typeface="SimSun" panose="02010600030101010101" pitchFamily="2" charset="-122"/>
               </a:rPr>
-              <a:t>@injectable()</a:t>
-            </a:r>
-            <a:r>
-              <a:rPr lang="zh-CN" altLang="en-US" sz="1600" b="0" dirty="0">
+              <a:t>injector</a:t>
+            </a:r>
+            <a:r>
+              <a:rPr lang="zh-CN" altLang="en-US" sz="1800" b="0" dirty="0">
                 <a:latin typeface="SimSun" panose="02010600030101010101" pitchFamily="2" charset="-122"/>
                 <a:ea typeface="SimSun" panose="02010600030101010101" pitchFamily="2" charset="-122"/>
               </a:rPr>
-              <a:t>？</a:t>
-            </a:r>
-            <a:endParaRPr lang="en-US" altLang="zh-CN" sz="1600" b="0" dirty="0">
+              <a:t>，当系统加载</a:t>
+            </a:r>
+            <a:endParaRPr lang="en-US" altLang="zh-CN" sz="1800" b="0" dirty="0">
               <a:latin typeface="SimSun" panose="02010600030101010101" pitchFamily="2" charset="-122"/>
               <a:ea typeface="SimSun" panose="02010600030101010101" pitchFamily="2" charset="-122"/>
             </a:endParaRPr>
           </a:p>
           <a:p>
-            <a:endParaRPr lang="en-US" sz="1600" dirty="0">
+            <a:r>
+              <a:rPr lang="zh-CN" altLang="en-US" sz="1800" b="0" dirty="0">
+                <a:latin typeface="SimSun" panose="02010600030101010101" pitchFamily="2" charset="-122"/>
+                <a:ea typeface="SimSun" panose="02010600030101010101" pitchFamily="2" charset="-122"/>
+              </a:rPr>
+              <a:t>（</a:t>
+            </a:r>
+            <a:r>
+              <a:rPr lang="en-US" altLang="zh-CN" sz="1800" b="0" dirty="0" err="1">
+                <a:latin typeface="SimSun" panose="02010600030101010101" pitchFamily="2" charset="-122"/>
+                <a:ea typeface="SimSun" panose="02010600030101010101" pitchFamily="2" charset="-122"/>
+              </a:rPr>
+              <a:t>platformBrowserDynamic</a:t>
+            </a:r>
+            <a:r>
+              <a:rPr lang="en-US" altLang="zh-CN" sz="1800" b="0" dirty="0">
+                <a:latin typeface="SimSun" panose="02010600030101010101" pitchFamily="2" charset="-122"/>
+                <a:ea typeface="SimSun" panose="02010600030101010101" pitchFamily="2" charset="-122"/>
+              </a:rPr>
+              <a:t>().</a:t>
+            </a:r>
+            <a:r>
+              <a:rPr lang="en-US" altLang="zh-CN" sz="1800" b="0" dirty="0" err="1">
+                <a:latin typeface="SimSun" panose="02010600030101010101" pitchFamily="2" charset="-122"/>
+                <a:ea typeface="SimSun" panose="02010600030101010101" pitchFamily="2" charset="-122"/>
+              </a:rPr>
+              <a:t>bootstrapModule</a:t>
+            </a:r>
+            <a:r>
+              <a:rPr lang="en-US" altLang="zh-CN" sz="1800" b="0" dirty="0">
+                <a:latin typeface="SimSun" panose="02010600030101010101" pitchFamily="2" charset="-122"/>
+                <a:ea typeface="SimSun" panose="02010600030101010101" pitchFamily="2" charset="-122"/>
+              </a:rPr>
+              <a:t>(</a:t>
+            </a:r>
+            <a:r>
+              <a:rPr lang="en-US" altLang="zh-CN" sz="1800" b="0" dirty="0" err="1">
+                <a:latin typeface="SimSun" panose="02010600030101010101" pitchFamily="2" charset="-122"/>
+                <a:ea typeface="SimSun" panose="02010600030101010101" pitchFamily="2" charset="-122"/>
+              </a:rPr>
+              <a:t>AppModule</a:t>
+            </a:r>
+            <a:r>
+              <a:rPr lang="en-US" altLang="zh-CN" sz="1800" b="0" dirty="0">
+                <a:latin typeface="SimSun" panose="02010600030101010101" pitchFamily="2" charset="-122"/>
+                <a:ea typeface="SimSun" panose="02010600030101010101" pitchFamily="2" charset="-122"/>
+              </a:rPr>
+              <a:t>);</a:t>
+            </a:r>
+            <a:r>
+              <a:rPr lang="zh-CN" altLang="en-US" sz="1800" b="0" dirty="0">
+                <a:latin typeface="SimSun" panose="02010600030101010101" pitchFamily="2" charset="-122"/>
+                <a:ea typeface="SimSun" panose="02010600030101010101" pitchFamily="2" charset="-122"/>
+              </a:rPr>
+              <a:t>）</a:t>
+            </a:r>
+            <a:endParaRPr lang="en-US" altLang="zh-CN" sz="1800" b="0" dirty="0">
               <a:latin typeface="SimSun" panose="02010600030101010101" pitchFamily="2" charset="-122"/>
               <a:ea typeface="SimSun" panose="02010600030101010101" pitchFamily="2" charset="-122"/>
             </a:endParaRPr>
           </a:p>
           <a:p>
             <a:r>
-              <a:rPr lang="zh-CN" altLang="en-US" sz="1600" b="0" dirty="0">
+              <a:rPr lang="zh-CN" altLang="en-US" sz="1800" b="0" dirty="0">
                 <a:latin typeface="SimSun" panose="02010600030101010101" pitchFamily="2" charset="-122"/>
                 <a:ea typeface="SimSun" panose="02010600030101010101" pitchFamily="2" charset="-122"/>
               </a:rPr>
-              <a:t>因为包括</a:t>
-            </a:r>
-            <a:r>
-              <a:rPr lang="en-US" altLang="zh-CN" sz="1600" b="0" dirty="0">
+              <a:t>时会自动创建全局的。</a:t>
+            </a:r>
+            <a:endParaRPr lang="en-US" sz="1800" b="0" dirty="0">
+              <a:latin typeface="SimSun" panose="02010600030101010101" pitchFamily="2" charset="-122"/>
+              <a:ea typeface="SimSun" panose="02010600030101010101" pitchFamily="2" charset="-122"/>
+            </a:endParaRPr>
+          </a:p>
+          <a:p>
+            <a:r>
+              <a:rPr lang="en-US" altLang="zh-CN" sz="1800" b="0" dirty="0">
                 <a:latin typeface="SimSun" panose="02010600030101010101" pitchFamily="2" charset="-122"/>
                 <a:ea typeface="SimSun" panose="02010600030101010101" pitchFamily="2" charset="-122"/>
               </a:rPr>
-              <a:t>@Component</a:t>
-            </a:r>
-            <a:r>
-              <a:rPr lang="zh-CN" altLang="en-US" sz="1600" b="0" dirty="0">
+              <a:t>3. </a:t>
+            </a:r>
+            <a:r>
+              <a:rPr lang="zh-CN" altLang="en-US" sz="1800" b="0" dirty="0">
                 <a:latin typeface="SimSun" panose="02010600030101010101" pitchFamily="2" charset="-122"/>
                 <a:ea typeface="SimSun" panose="02010600030101010101" pitchFamily="2" charset="-122"/>
               </a:rPr>
-              <a:t>，</a:t>
-            </a:r>
-            <a:r>
-              <a:rPr lang="en-US" altLang="zh-CN" sz="1600" b="0" dirty="0">
+              <a:t>注册</a:t>
+            </a:r>
+            <a:r>
+              <a:rPr lang="en-US" altLang="zh-CN" sz="1800" b="0" dirty="0">
                 <a:latin typeface="SimSun" panose="02010600030101010101" pitchFamily="2" charset="-122"/>
                 <a:ea typeface="SimSun" panose="02010600030101010101" pitchFamily="2" charset="-122"/>
               </a:rPr>
-              <a:t>@Directive</a:t>
-            </a:r>
-            <a:r>
-              <a:rPr lang="zh-CN" altLang="en-US" sz="1600" b="0" dirty="0">
+              <a:t>Provider</a:t>
+            </a:r>
+            <a:r>
+              <a:rPr lang="zh-CN" altLang="en-US" sz="1800" b="0" dirty="0">
                 <a:latin typeface="SimSun" panose="02010600030101010101" pitchFamily="2" charset="-122"/>
                 <a:ea typeface="SimSun" panose="02010600030101010101" pitchFamily="2" charset="-122"/>
               </a:rPr>
-              <a:t>，</a:t>
-            </a:r>
-            <a:r>
-              <a:rPr lang="en-US" altLang="zh-CN" sz="1600" b="0" dirty="0">
+              <a:t>有两个地方：</a:t>
+            </a:r>
+            <a:r>
+              <a:rPr lang="en-US" sz="1800" b="0" dirty="0" err="1">
                 <a:latin typeface="SimSun" panose="02010600030101010101" pitchFamily="2" charset="-122"/>
                 <a:ea typeface="SimSun" panose="02010600030101010101" pitchFamily="2" charset="-122"/>
               </a:rPr>
-              <a:t>@Pipe</a:t>
-            </a:r>
-            <a:r>
-              <a:rPr lang="zh-CN" altLang="en-US" sz="1600" b="0" dirty="0">
+              <a:t>NgModule</a:t>
+            </a:r>
+            <a:r>
+              <a:rPr lang="en-US" sz="1800" b="0" dirty="0">
                 <a:latin typeface="SimSun" panose="02010600030101010101" pitchFamily="2" charset="-122"/>
                 <a:ea typeface="SimSun" panose="02010600030101010101" pitchFamily="2" charset="-122"/>
               </a:rPr>
-              <a:t>都是</a:t>
-            </a:r>
-            <a:r>
-              <a:rPr lang="en-US" altLang="zh-CN" sz="1600" b="0" dirty="0">
+              <a:t> </a:t>
+            </a:r>
+            <a:r>
+              <a:rPr lang="zh-CN" altLang="en-US" sz="1800" b="0" dirty="0">
                 <a:latin typeface="SimSun" panose="02010600030101010101" pitchFamily="2" charset="-122"/>
                 <a:ea typeface="SimSun" panose="02010600030101010101" pitchFamily="2" charset="-122"/>
               </a:rPr>
-              <a:t>@injectable</a:t>
-            </a:r>
-            <a:r>
-              <a:rPr lang="zh-CN" altLang="en-US" sz="1600" b="0" dirty="0">
+              <a:t>或者 </a:t>
+            </a:r>
+            <a:r>
+              <a:rPr lang="en-US" sz="1800" b="0" dirty="0">
                 <a:latin typeface="SimSun" panose="02010600030101010101" pitchFamily="2" charset="-122"/>
                 <a:ea typeface="SimSun" panose="02010600030101010101" pitchFamily="2" charset="-122"/>
               </a:rPr>
-              <a:t>的子类型。</a:t>
-            </a:r>
-            <a:endParaRPr lang="en-US" sz="1600" b="0" dirty="0">
+              <a:t>components.</a:t>
+            </a:r>
+          </a:p>
+          <a:p>
+            <a:endParaRPr lang="en-US" sz="1800" b="0" dirty="0">
+              <a:latin typeface="SimSun" panose="02010600030101010101" pitchFamily="2" charset="-122"/>
+              <a:ea typeface="SimSun" panose="02010600030101010101" pitchFamily="2" charset="-122"/>
+            </a:endParaRPr>
+          </a:p>
+          <a:p>
+            <a:r>
+              <a:rPr lang="en-US" sz="1800" b="0" dirty="0">
+                <a:latin typeface="SimSun" panose="02010600030101010101" pitchFamily="2" charset="-122"/>
+                <a:ea typeface="SimSun" panose="02010600030101010101" pitchFamily="2" charset="-122"/>
+              </a:rPr>
+              <a:t>Injector providers</a:t>
+            </a:r>
+            <a:endParaRPr lang="en-US" sz="1800" b="0" dirty="0">
+              <a:latin typeface="SimSun" panose="02010600030101010101" pitchFamily="2" charset="-122"/>
+              <a:ea typeface="SimSun" panose="02010600030101010101" pitchFamily="2" charset="-122"/>
+            </a:endParaRPr>
+          </a:p>
+          <a:p>
+            <a:r>
+              <a:rPr lang="en-US" sz="1800" b="0" dirty="0">
+                <a:latin typeface="SimSun" panose="02010600030101010101" pitchFamily="2" charset="-122"/>
+                <a:ea typeface="SimSun" panose="02010600030101010101" pitchFamily="2" charset="-122"/>
+              </a:rPr>
+              <a:t>Value providers</a:t>
+            </a:r>
+          </a:p>
+          <a:p>
+            <a:r>
+              <a:rPr lang="zh-CN" altLang="en-US" sz="1800" b="0" dirty="0">
+                <a:latin typeface="SimSun" panose="02010600030101010101" pitchFamily="2" charset="-122"/>
+                <a:ea typeface="SimSun" panose="02010600030101010101" pitchFamily="2" charset="-122"/>
+              </a:rPr>
+              <a:t>提供一个预先做好的对象会比请求注入器从类中创建它更容易。</a:t>
+            </a:r>
+            <a:endParaRPr lang="en-US" sz="1800" b="0" dirty="0">
+              <a:latin typeface="SimSun" panose="02010600030101010101" pitchFamily="2" charset="-122"/>
+              <a:ea typeface="SimSun" panose="02010600030101010101" pitchFamily="2" charset="-122"/>
+            </a:endParaRPr>
+          </a:p>
+          <a:p>
+            <a:r>
+              <a:rPr lang="en-US" sz="1800" b="0" dirty="0">
+                <a:latin typeface="SimSun" panose="02010600030101010101" pitchFamily="2" charset="-122"/>
+                <a:ea typeface="SimSun" panose="02010600030101010101" pitchFamily="2" charset="-122"/>
+              </a:rPr>
+              <a:t>Factory providers</a:t>
+            </a:r>
+          </a:p>
+          <a:p>
+            <a:r>
+              <a:rPr lang="zh-CN" altLang="en-US" sz="1800" b="0" dirty="0">
+                <a:latin typeface="SimSun" panose="02010600030101010101" pitchFamily="2" charset="-122"/>
+                <a:ea typeface="SimSun" panose="02010600030101010101" pitchFamily="2" charset="-122"/>
+              </a:rPr>
+              <a:t>我们需要动态创建这个依赖值，因为它所需要的信息直到最后一刻才能确定</a:t>
+            </a:r>
+            <a:endParaRPr lang="en-US" sz="1800" b="0" dirty="0">
               <a:latin typeface="SimSun" panose="02010600030101010101" pitchFamily="2" charset="-122"/>
               <a:ea typeface="SimSun" panose="02010600030101010101" pitchFamily="2" charset="-122"/>
             </a:endParaRPr>
@@ -18349,7 +18425,7 @@
     </p:spTree>
     <p:extLst>
       <p:ext uri="{BB962C8B-B14F-4D97-AF65-F5344CB8AC3E}">
-        <p14:creationId xmlns:p14="http://schemas.microsoft.com/office/powerpoint/2010/main" val="2157410703"/>
+        <p14:creationId xmlns:p14="http://schemas.microsoft.com/office/powerpoint/2010/main" val="4242534312"/>
       </p:ext>
     </p:extLst>
   </p:cSld>
@@ -18580,14 +18656,14 @@
       </p:sp>
       <p:sp>
         <p:nvSpPr>
-          <p:cNvPr id="3" name="Rectangle 2"/>
+          <p:cNvPr id="7" name="Rectangle 6"/>
           <p:cNvSpPr/>
           <p:nvPr/>
         </p:nvSpPr>
         <p:spPr>
           <a:xfrm>
-            <a:off x="350080" y="1214845"/>
-            <a:ext cx="2595582" cy="646331"/>
+            <a:off x="454272" y="1489405"/>
+            <a:ext cx="1560042" cy="369332"/>
           </a:xfrm>
           <a:prstGeom prst="rect">
             <a:avLst/>
@@ -18600,39 +18676,76 @@
           <a:lstStyle/>
           <a:p>
             <a:r>
-              <a:rPr lang="en-US" sz="2000" b="0" dirty="0">
-                <a:latin typeface="SimSun" panose="02010600030101010101" pitchFamily="2" charset="-122"/>
-                <a:ea typeface="SimSun" panose="02010600030101010101" pitchFamily="2" charset="-122"/>
-              </a:rPr>
-              <a:t>Injector</a:t>
-            </a:r>
-            <a:r>
-              <a:rPr lang="en-US" sz="3600" b="0" dirty="0">
-                <a:latin typeface="SimSun" panose="02010600030101010101" pitchFamily="2" charset="-122"/>
-                <a:ea typeface="SimSun" panose="02010600030101010101" pitchFamily="2" charset="-122"/>
-              </a:rPr>
-              <a:t> </a:t>
-            </a:r>
-            <a:r>
-              <a:rPr lang="en-US" sz="2000" b="0" dirty="0">
-                <a:latin typeface="SimSun" panose="02010600030101010101" pitchFamily="2" charset="-122"/>
-                <a:ea typeface="SimSun" panose="02010600030101010101" pitchFamily="2" charset="-122"/>
-              </a:rPr>
-              <a:t>providers</a:t>
-            </a:r>
+              <a:rPr lang="en-US" sz="1800" b="0" i="1" dirty="0">
+                <a:latin typeface="Roboto"/>
+              </a:rPr>
+              <a:t>@Injectable()</a:t>
+            </a:r>
+            <a:endParaRPr lang="en-US" sz="1800" b="0" i="0" dirty="0">
+              <a:effectLst/>
+              <a:latin typeface="Roboto"/>
+            </a:endParaRPr>
           </a:p>
         </p:txBody>
       </p:sp>
+      <p:pic>
+        <p:nvPicPr>
+          <p:cNvPr id="9" name="Picture 8"/>
+          <p:cNvPicPr>
+            <a:picLocks noChangeAspect="1"/>
+          </p:cNvPicPr>
+          <p:nvPr/>
+        </p:nvPicPr>
+        <p:blipFill>
+          <a:blip r:embed="rId3"/>
+          <a:stretch>
+            <a:fillRect/>
+          </a:stretch>
+        </p:blipFill>
+        <p:spPr>
+          <a:xfrm>
+            <a:off x="461035" y="3840607"/>
+            <a:ext cx="2820321" cy="1639433"/>
+          </a:xfrm>
+          <a:prstGeom prst="rect">
+            <a:avLst/>
+          </a:prstGeom>
+        </p:spPr>
+      </p:pic>
+      <p:pic>
+        <p:nvPicPr>
+          <p:cNvPr id="10" name="Picture 9"/>
+          <p:cNvPicPr>
+            <a:picLocks noChangeAspect="1"/>
+          </p:cNvPicPr>
+          <p:nvPr/>
+        </p:nvPicPr>
+        <p:blipFill>
+          <a:blip r:embed="rId4"/>
+          <a:stretch>
+            <a:fillRect/>
+          </a:stretch>
+        </p:blipFill>
+        <p:spPr>
+          <a:xfrm>
+            <a:off x="483867" y="2099988"/>
+            <a:ext cx="8159595" cy="1346026"/>
+          </a:xfrm>
+          <a:prstGeom prst="rect">
+            <a:avLst/>
+          </a:prstGeom>
+        </p:spPr>
+      </p:pic>
       <p:sp>
         <p:nvSpPr>
-          <p:cNvPr id="7" name="Rectangle 6"/>
+          <p:cNvPr id="13" name="Rectangle 12"/>
           <p:cNvSpPr/>
           <p:nvPr/>
         </p:nvSpPr>
         <p:spPr>
           <a:xfrm>
-            <a:off x="350081" y="1861176"/>
-            <a:ext cx="8257023" cy="1477328"/>
+            <a:off x="3447849" y="3840607"/>
+            <a:ext cx="5159256" cy="1815882"/>
           </a:xfrm>
           <a:prstGeom prst="rect">
             <a:avLst/>
@@ -18645,289 +18758,206 @@
           <a:lstStyle/>
           <a:p>
             <a:r>
-              <a:rPr lang="zh-CN" altLang="en-US" sz="1800" b="0" dirty="0">
+              <a:rPr lang="en-US" altLang="zh-CN" sz="1600" b="0" dirty="0">
                 <a:latin typeface="SimSun" panose="02010600030101010101" pitchFamily="2" charset="-122"/>
                 <a:ea typeface="SimSun" panose="02010600030101010101" pitchFamily="2" charset="-122"/>
               </a:rPr>
-              <a:t>提供商提供依赖值的一个具体的、运行时的版本。 注入器依靠提供商创建服务的实例，注入器再将服务的实例注入组件或其它服务。</a:t>
-            </a:r>
-          </a:p>
-          <a:p>
-            <a:r>
-              <a:rPr lang="zh-CN" altLang="en-US" sz="1800" b="0" dirty="0">
+              <a:t>@Injectable()</a:t>
+            </a:r>
+            <a:r>
+              <a:rPr lang="ja-JP" altLang="en-US" sz="1600" b="0" dirty="0">
                 <a:latin typeface="SimSun" panose="02010600030101010101" pitchFamily="2" charset="-122"/>
                 <a:ea typeface="SimSun" panose="02010600030101010101" pitchFamily="2" charset="-122"/>
               </a:rPr>
-              <a:t>必须为注入器注册一个服务的提供商，否则它不知道该如何创建该服务</a:t>
-            </a:r>
-            <a:endParaRPr lang="en-US" altLang="zh-CN" sz="1800" b="0" dirty="0">
+              <a:t>标志着一个类可以被一个注入器实例化</a:t>
+            </a:r>
+            <a:r>
+              <a:rPr lang="en-US" altLang="ja-JP" sz="1600" b="0" dirty="0">
+                <a:latin typeface="SimSun" panose="02010600030101010101" pitchFamily="2" charset="-122"/>
+                <a:ea typeface="SimSun" panose="02010600030101010101" pitchFamily="2" charset="-122"/>
+              </a:rPr>
+              <a:t>;</a:t>
+            </a:r>
+            <a:r>
+              <a:rPr lang="ja-JP" altLang="en-US" sz="1600" b="0" dirty="0">
+                <a:latin typeface="SimSun" panose="02010600030101010101" pitchFamily="2" charset="-122"/>
+                <a:ea typeface="SimSun" panose="02010600030101010101" pitchFamily="2" charset="-122"/>
+              </a:rPr>
+              <a:t>通常来讲</a:t>
+            </a:r>
+            <a:r>
+              <a:rPr lang="en-US" altLang="ja-JP" sz="1600" b="0" dirty="0">
+                <a:latin typeface="SimSun" panose="02010600030101010101" pitchFamily="2" charset="-122"/>
+                <a:ea typeface="SimSun" panose="02010600030101010101" pitchFamily="2" charset="-122"/>
+              </a:rPr>
+              <a:t>,</a:t>
+            </a:r>
+            <a:r>
+              <a:rPr lang="ja-JP" altLang="en-US" sz="1600" b="0" dirty="0">
+                <a:latin typeface="SimSun" panose="02010600030101010101" pitchFamily="2" charset="-122"/>
+                <a:ea typeface="SimSun" panose="02010600030101010101" pitchFamily="2" charset="-122"/>
+              </a:rPr>
+              <a:t>在试图实例化一个没有被标识为</a:t>
+            </a:r>
+            <a:r>
+              <a:rPr lang="en-US" altLang="ja-JP" sz="1600" b="0" dirty="0">
+                <a:latin typeface="SimSun" panose="02010600030101010101" pitchFamily="2" charset="-122"/>
+                <a:ea typeface="SimSun" panose="02010600030101010101" pitchFamily="2" charset="-122"/>
+              </a:rPr>
+              <a:t>@</a:t>
+            </a:r>
+            <a:r>
+              <a:rPr lang="en-US" altLang="zh-CN" sz="1600" b="0" dirty="0">
+                <a:latin typeface="SimSun" panose="02010600030101010101" pitchFamily="2" charset="-122"/>
+                <a:ea typeface="SimSun" panose="02010600030101010101" pitchFamily="2" charset="-122"/>
+              </a:rPr>
+              <a:t>Injectable()</a:t>
+            </a:r>
+            <a:r>
+              <a:rPr lang="ja-JP" altLang="en-US" sz="1600" b="0" dirty="0">
+                <a:latin typeface="SimSun" panose="02010600030101010101" pitchFamily="2" charset="-122"/>
+                <a:ea typeface="SimSun" panose="02010600030101010101" pitchFamily="2" charset="-122"/>
+              </a:rPr>
+              <a:t>的类时候</a:t>
+            </a:r>
+            <a:r>
+              <a:rPr lang="en-US" altLang="ja-JP" sz="1600" b="0" dirty="0">
+                <a:latin typeface="SimSun" panose="02010600030101010101" pitchFamily="2" charset="-122"/>
+                <a:ea typeface="SimSun" panose="02010600030101010101" pitchFamily="2" charset="-122"/>
+              </a:rPr>
+              <a:t>,</a:t>
+            </a:r>
+            <a:r>
+              <a:rPr lang="ja-JP" altLang="en-US" sz="1600" b="0" dirty="0">
+                <a:latin typeface="SimSun" panose="02010600030101010101" pitchFamily="2" charset="-122"/>
+                <a:ea typeface="SimSun" panose="02010600030101010101" pitchFamily="2" charset="-122"/>
+              </a:rPr>
+              <a:t>注入器将会报告错误</a:t>
+            </a:r>
+            <a:r>
+              <a:rPr lang="en-US" altLang="ja-JP" sz="1600" b="0" dirty="0">
+                <a:latin typeface="SimSun" panose="02010600030101010101" pitchFamily="2" charset="-122"/>
+                <a:ea typeface="SimSun" panose="02010600030101010101" pitchFamily="2" charset="-122"/>
+              </a:rPr>
+              <a:t>.</a:t>
+            </a:r>
+            <a:endParaRPr lang="en-US" altLang="zh-CN" sz="1600" b="0" dirty="0">
               <a:latin typeface="SimSun" panose="02010600030101010101" pitchFamily="2" charset="-122"/>
               <a:ea typeface="SimSun" panose="02010600030101010101" pitchFamily="2" charset="-122"/>
             </a:endParaRPr>
           </a:p>
           <a:p>
-            <a:endParaRPr lang="en-US" altLang="zh-CN" sz="1800" b="0" dirty="0">
+            <a:endParaRPr lang="en-US" altLang="zh-CN" sz="1600" b="0" dirty="0">
               <a:latin typeface="SimSun" panose="02010600030101010101" pitchFamily="2" charset="-122"/>
               <a:ea typeface="SimSun" panose="02010600030101010101" pitchFamily="2" charset="-122"/>
             </a:endParaRPr>
           </a:p>
           <a:p>
-            <a:endParaRPr lang="zh-CN" altLang="en-US" sz="1800" b="0" dirty="0">
+            <a:r>
+              <a:rPr lang="zh-CN" altLang="en-US" sz="1600" b="0" dirty="0">
+                <a:latin typeface="SimSun" panose="02010600030101010101" pitchFamily="2" charset="-122"/>
+                <a:ea typeface="SimSun" panose="02010600030101010101" pitchFamily="2" charset="-122"/>
+              </a:rPr>
+              <a:t>为什么我们的</a:t>
+            </a:r>
+            <a:r>
+              <a:rPr lang="en-US" altLang="zh-CN" sz="1600" b="0" dirty="0">
+                <a:latin typeface="SimSun" panose="02010600030101010101" pitchFamily="2" charset="-122"/>
+                <a:ea typeface="SimSun" panose="02010600030101010101" pitchFamily="2" charset="-122"/>
+              </a:rPr>
+              <a:t>Component</a:t>
+            </a:r>
+            <a:r>
+              <a:rPr lang="zh-CN" altLang="en-US" sz="1600" b="0" dirty="0">
+                <a:latin typeface="SimSun" panose="02010600030101010101" pitchFamily="2" charset="-122"/>
+                <a:ea typeface="SimSun" panose="02010600030101010101" pitchFamily="2" charset="-122"/>
+              </a:rPr>
+              <a:t>不需要加</a:t>
+            </a:r>
+            <a:r>
+              <a:rPr lang="en-US" altLang="zh-CN" sz="1600" b="0" dirty="0">
+                <a:latin typeface="SimSun" panose="02010600030101010101" pitchFamily="2" charset="-122"/>
+                <a:ea typeface="SimSun" panose="02010600030101010101" pitchFamily="2" charset="-122"/>
+              </a:rPr>
+              <a:t>@injectable()</a:t>
+            </a:r>
+            <a:r>
+              <a:rPr lang="zh-CN" altLang="en-US" sz="1600" b="0" dirty="0">
+                <a:latin typeface="SimSun" panose="02010600030101010101" pitchFamily="2" charset="-122"/>
+                <a:ea typeface="SimSun" panose="02010600030101010101" pitchFamily="2" charset="-122"/>
+              </a:rPr>
+              <a:t>？</a:t>
+            </a:r>
+            <a:endParaRPr lang="en-US" sz="1600" dirty="0">
               <a:latin typeface="SimSun" panose="02010600030101010101" pitchFamily="2" charset="-122"/>
               <a:ea typeface="SimSun" panose="02010600030101010101" pitchFamily="2" charset="-122"/>
             </a:endParaRPr>
           </a:p>
-        </p:txBody>
-      </p:sp>
-      <p:sp>
-        <p:nvSpPr>
-          <p:cNvPr id="9" name="Rectangle 8"/>
-          <p:cNvSpPr/>
-          <p:nvPr/>
-        </p:nvSpPr>
-        <p:spPr>
-          <a:xfrm>
-            <a:off x="806791" y="2766837"/>
-            <a:ext cx="5955476" cy="707886"/>
-          </a:xfrm>
-          <a:prstGeom prst="rect">
-            <a:avLst/>
-          </a:prstGeom>
-        </p:spPr>
-        <p:txBody>
-          <a:bodyPr wrap="none">
-            <a:spAutoFit/>
-          </a:bodyPr>
-          <a:lstStyle/>
-          <a:p>
-            <a:r>
-              <a:rPr lang="en-US" sz="2000" b="0" dirty="0">
-                <a:solidFill>
-                  <a:srgbClr val="0070C0"/>
-                </a:solidFill>
+          <a:p>
+            <a:r>
+              <a:rPr lang="zh-CN" altLang="en-US" sz="1600" b="0" dirty="0">
                 <a:latin typeface="SimSun" panose="02010600030101010101" pitchFamily="2" charset="-122"/>
                 <a:ea typeface="SimSun" panose="02010600030101010101" pitchFamily="2" charset="-122"/>
               </a:rPr>
-              <a:t>providers: [Logger]</a:t>
-            </a:r>
-          </a:p>
-          <a:p>
-            <a:r>
-              <a:rPr lang="en-US" sz="2000" b="0" dirty="0">
-                <a:solidFill>
-                  <a:srgbClr val="0070C0"/>
-                </a:solidFill>
+              <a:t>因为包括</a:t>
+            </a:r>
+            <a:r>
+              <a:rPr lang="en-US" altLang="zh-CN" sz="1600" b="0" dirty="0">
                 <a:latin typeface="SimSun" panose="02010600030101010101" pitchFamily="2" charset="-122"/>
                 <a:ea typeface="SimSun" panose="02010600030101010101" pitchFamily="2" charset="-122"/>
               </a:rPr>
-              <a:t>[{ provide: Logger, </a:t>
-            </a:r>
-            <a:r>
-              <a:rPr lang="en-US" sz="2000" b="0" dirty="0" err="1">
-                <a:solidFill>
-                  <a:srgbClr val="0070C0"/>
-                </a:solidFill>
+              <a:t>@Component</a:t>
+            </a:r>
+            <a:r>
+              <a:rPr lang="zh-CN" altLang="en-US" sz="1600" b="0" dirty="0">
                 <a:latin typeface="SimSun" panose="02010600030101010101" pitchFamily="2" charset="-122"/>
                 <a:ea typeface="SimSun" panose="02010600030101010101" pitchFamily="2" charset="-122"/>
               </a:rPr>
-              <a:t>useClass</a:t>
-            </a:r>
-            <a:r>
-              <a:rPr lang="en-US" sz="2000" b="0" dirty="0">
-                <a:solidFill>
-                  <a:srgbClr val="0070C0"/>
-                </a:solidFill>
+              <a:t>，</a:t>
+            </a:r>
+            <a:r>
+              <a:rPr lang="en-US" altLang="zh-CN" sz="1600" b="0" dirty="0">
                 <a:latin typeface="SimSun" panose="02010600030101010101" pitchFamily="2" charset="-122"/>
                 <a:ea typeface="SimSun" panose="02010600030101010101" pitchFamily="2" charset="-122"/>
               </a:rPr>
-              <a:t>: </a:t>
-            </a:r>
-            <a:r>
-              <a:rPr lang="en-US" sz="2000" b="0" dirty="0" err="1">
-                <a:solidFill>
-                  <a:srgbClr val="0070C0"/>
-                </a:solidFill>
+              <a:t>@Directive</a:t>
+            </a:r>
+            <a:r>
+              <a:rPr lang="zh-CN" altLang="en-US" sz="1600" b="0" dirty="0">
                 <a:latin typeface="SimSun" panose="02010600030101010101" pitchFamily="2" charset="-122"/>
                 <a:ea typeface="SimSun" panose="02010600030101010101" pitchFamily="2" charset="-122"/>
               </a:rPr>
-              <a:t>BetterLogger</a:t>
-            </a:r>
-            <a:r>
-              <a:rPr lang="en-US" sz="2000" b="0" dirty="0">
-                <a:solidFill>
-                  <a:srgbClr val="0070C0"/>
-                </a:solidFill>
+              <a:t>，</a:t>
+            </a:r>
+            <a:r>
+              <a:rPr lang="en-US" altLang="zh-CN" sz="1600" b="0" dirty="0">
                 <a:latin typeface="SimSun" panose="02010600030101010101" pitchFamily="2" charset="-122"/>
                 <a:ea typeface="SimSun" panose="02010600030101010101" pitchFamily="2" charset="-122"/>
               </a:rPr>
-              <a:t> }]</a:t>
-            </a:r>
-          </a:p>
-        </p:txBody>
-      </p:sp>
-      <p:sp>
-        <p:nvSpPr>
-          <p:cNvPr id="10" name="Rectangle 9"/>
-          <p:cNvSpPr/>
-          <p:nvPr/>
-        </p:nvSpPr>
-        <p:spPr>
-          <a:xfrm>
-            <a:off x="378952" y="3318223"/>
-            <a:ext cx="8131190" cy="1138773"/>
-          </a:xfrm>
-          <a:prstGeom prst="rect">
-            <a:avLst/>
-          </a:prstGeom>
-        </p:spPr>
-        <p:txBody>
-          <a:bodyPr wrap="square">
-            <a:spAutoFit/>
-          </a:bodyPr>
-          <a:lstStyle/>
-          <a:p>
-            <a:pPr marL="342900" indent="-342900">
-              <a:buAutoNum type="arabicPeriod"/>
-            </a:pPr>
-            <a:r>
-              <a:rPr lang="en-US" sz="1800" b="0" dirty="0">
+              <a:t>@Pipe</a:t>
+            </a:r>
+            <a:r>
+              <a:rPr lang="zh-CN" altLang="en-US" sz="1600" b="0" dirty="0">
                 <a:latin typeface="SimSun" panose="02010600030101010101" pitchFamily="2" charset="-122"/>
                 <a:ea typeface="SimSun" panose="02010600030101010101" pitchFamily="2" charset="-122"/>
               </a:rPr>
-              <a:t>Registering</a:t>
-            </a:r>
-            <a:r>
-              <a:rPr lang="en-US" b="0" dirty="0">
-                <a:latin typeface="Roboto"/>
-              </a:rPr>
-              <a:t> </a:t>
-            </a:r>
-            <a:r>
-              <a:rPr lang="en-US" sz="1800" b="0" dirty="0">
+              <a:t>都是</a:t>
+            </a:r>
+            <a:r>
+              <a:rPr lang="en-US" altLang="zh-CN" sz="1600" b="0" dirty="0">
                 <a:latin typeface="SimSun" panose="02010600030101010101" pitchFamily="2" charset="-122"/>
                 <a:ea typeface="SimSun" panose="02010600030101010101" pitchFamily="2" charset="-122"/>
               </a:rPr>
-              <a:t>providers in an NgModule1</a:t>
-            </a:r>
-          </a:p>
-          <a:p>
-            <a:pPr marL="342900" indent="-342900">
-              <a:buFontTx/>
-              <a:buAutoNum type="arabicPeriod"/>
-            </a:pPr>
-            <a:r>
-              <a:rPr lang="en-US" sz="1800" b="0" dirty="0">
+              <a:t>@injectable</a:t>
+            </a:r>
+            <a:r>
+              <a:rPr lang="zh-CN" altLang="en-US" sz="1600" b="0" dirty="0">
                 <a:latin typeface="SimSun" panose="02010600030101010101" pitchFamily="2" charset="-122"/>
                 <a:ea typeface="SimSun" panose="02010600030101010101" pitchFamily="2" charset="-122"/>
               </a:rPr>
-              <a:t>Registering providers in a component</a:t>
-            </a:r>
-          </a:p>
-          <a:p>
-            <a:pPr marL="342900" indent="-342900">
-              <a:buAutoNum type="arabicPeriod"/>
-            </a:pPr>
-            <a:endParaRPr lang="en-US" sz="1800" b="0" dirty="0">
-              <a:latin typeface="SimSun" panose="02010600030101010101" pitchFamily="2" charset="-122"/>
-              <a:ea typeface="SimSun" panose="02010600030101010101" pitchFamily="2" charset="-122"/>
-            </a:endParaRPr>
-          </a:p>
-        </p:txBody>
-      </p:sp>
-      <p:sp>
-        <p:nvSpPr>
-          <p:cNvPr id="13" name="Rectangle 12"/>
-          <p:cNvSpPr/>
-          <p:nvPr/>
-        </p:nvSpPr>
-        <p:spPr>
-          <a:xfrm>
-            <a:off x="395730" y="6004372"/>
-            <a:ext cx="9624430" cy="523220"/>
-          </a:xfrm>
-          <a:prstGeom prst="rect">
-            <a:avLst/>
-          </a:prstGeom>
-        </p:spPr>
-        <p:txBody>
-          <a:bodyPr wrap="square">
-            <a:spAutoFit/>
-          </a:bodyPr>
-          <a:lstStyle/>
-          <a:p>
-            <a:r>
-              <a:rPr lang="en-US" sz="1400" b="0" dirty="0">
-                <a:hlinkClick r:id="rId3"/>
-              </a:rPr>
-              <a:t>https://angular.io/guide/dependency-injection</a:t>
-            </a:r>
-            <a:endParaRPr lang="en-US" sz="1400" b="0" dirty="0"/>
-          </a:p>
-          <a:p>
-            <a:endParaRPr lang="en-US" sz="1400" b="0" dirty="0"/>
-          </a:p>
-        </p:txBody>
-      </p:sp>
-      <p:sp>
-        <p:nvSpPr>
-          <p:cNvPr id="14" name="Rectangle 13"/>
-          <p:cNvSpPr/>
-          <p:nvPr/>
-        </p:nvSpPr>
-        <p:spPr>
-          <a:xfrm>
-            <a:off x="403759" y="4479941"/>
-            <a:ext cx="7802136" cy="1261884"/>
-          </a:xfrm>
-          <a:prstGeom prst="rect">
-            <a:avLst/>
-          </a:prstGeom>
-        </p:spPr>
-        <p:txBody>
-          <a:bodyPr wrap="none">
-            <a:spAutoFit/>
-          </a:bodyPr>
-          <a:lstStyle/>
-          <a:p>
-            <a:r>
-              <a:rPr lang="en-US" sz="2000" b="0" dirty="0">
-                <a:latin typeface="SimSun" panose="02010600030101010101" pitchFamily="2" charset="-122"/>
-                <a:ea typeface="SimSun" panose="02010600030101010101" pitchFamily="2" charset="-122"/>
-              </a:rPr>
-              <a:t>Value providers</a:t>
-            </a:r>
-          </a:p>
-          <a:p>
-            <a:r>
-              <a:rPr lang="zh-CN" altLang="en-US" sz="1800" b="0" dirty="0">
-                <a:latin typeface="SimSun" panose="02010600030101010101" pitchFamily="2" charset="-122"/>
-                <a:ea typeface="SimSun" panose="02010600030101010101" pitchFamily="2" charset="-122"/>
-              </a:rPr>
-              <a:t>提供一个预先做好的对象会比请求注入器从类中创建它更容易。</a:t>
-            </a:r>
-            <a:endParaRPr lang="en-US" sz="1800" b="0" dirty="0">
-              <a:latin typeface="SimSun" panose="02010600030101010101" pitchFamily="2" charset="-122"/>
-              <a:ea typeface="SimSun" panose="02010600030101010101" pitchFamily="2" charset="-122"/>
-            </a:endParaRPr>
-          </a:p>
-          <a:p>
-            <a:r>
-              <a:rPr lang="en-US" sz="2000" b="0" dirty="0">
-                <a:latin typeface="SimSun" panose="02010600030101010101" pitchFamily="2" charset="-122"/>
-                <a:ea typeface="SimSun" panose="02010600030101010101" pitchFamily="2" charset="-122"/>
-              </a:rPr>
-              <a:t>Factory providers</a:t>
-            </a:r>
-          </a:p>
-          <a:p>
-            <a:r>
-              <a:rPr lang="zh-CN" altLang="en-US" sz="1800" b="0" dirty="0">
-                <a:latin typeface="SimSun" panose="02010600030101010101" pitchFamily="2" charset="-122"/>
-                <a:ea typeface="SimSun" panose="02010600030101010101" pitchFamily="2" charset="-122"/>
-              </a:rPr>
-              <a:t>我们需要动态创建这个依赖值，因为它所需要的信息直到最后一刻才能确定</a:t>
-            </a:r>
-            <a:endParaRPr lang="en-US" sz="1800" b="0" dirty="0">
+              <a:t>的子类型。</a:t>
+            </a:r>
+            <a:endParaRPr lang="en-US" sz="1600" b="0" dirty="0">
               <a:latin typeface="SimSun" panose="02010600030101010101" pitchFamily="2" charset="-122"/>
               <a:ea typeface="SimSun" panose="02010600030101010101" pitchFamily="2" charset="-122"/>
             </a:endParaRPr>
@@ -18937,7 +18967,7 @@
     </p:spTree>
     <p:extLst>
       <p:ext uri="{BB962C8B-B14F-4D97-AF65-F5344CB8AC3E}">
-        <p14:creationId xmlns:p14="http://schemas.microsoft.com/office/powerpoint/2010/main" val="4242534312"/>
+        <p14:creationId xmlns:p14="http://schemas.microsoft.com/office/powerpoint/2010/main" val="2157410703"/>
       </p:ext>
     </p:extLst>
   </p:cSld>
@@ -21680,6 +21710,31 @@
 </file>
 
 <file path=customXml/item1.xml><?xml version="1.0" encoding="utf-8"?>
+<?mso-contentType ?>
+<FormTemplates xmlns="http://schemas.microsoft.com/sharepoint/v3/contenttype/forms">
+  <Display>DocumentLibraryForm</Display>
+  <Edit>DocumentLibraryForm</Edit>
+  <New>DocumentLibraryForm</New>
+</FormTemplates>
+</file>
+
+<file path=customXml/item2.xml><?xml version="1.0" encoding="utf-8"?>
+<p:properties xmlns:p="http://schemas.microsoft.com/office/2006/metadata/properties" xmlns:xsi="http://www.w3.org/2001/XMLSchema-instance" xmlns:pc="http://schemas.microsoft.com/office/infopath/2007/PartnerControls">
+  <documentManagement>
+    <TemplateUrl xmlns="http://schemas.microsoft.com/sharepoint/v3" xsi:nil="true"/>
+    <_SourceUrl xmlns="http://schemas.microsoft.com/sharepoint/v3" xsi:nil="true"/>
+    <Comments0 xmlns="C6B13D8A-F6C8-4777-9906-93DFDA163C9A" xsi:nil="true"/>
+    <xd_ProgID xmlns="http://schemas.microsoft.com/sharepoint/v3" xsi:nil="true"/>
+    <test xmlns="C6B13D8A-F6C8-4777-9906-93DFDA163C9A" xsi:nil="true"/>
+    <Order xmlns="http://schemas.microsoft.com/sharepoint/v3" xsi:nil="true"/>
+    <_SharedFileIndex xmlns="http://schemas.microsoft.com/sharepoint/v3" xsi:nil="true"/>
+    <MetaInfo xmlns="http://schemas.microsoft.com/sharepoint/v3" xsi:nil="true"/>
+    <ContentTypeId xmlns="http://schemas.microsoft.com/sharepoint/v3">0x0101008A3DB1C6C8F67747990693DFDA163C9A</ContentTypeId>
+  </documentManagement>
+</p:properties>
+</file>
+
+<file path=customXml/item3.xml><?xml version="1.0" encoding="utf-8"?>
 <ct:contentTypeSchema xmlns:ct="http://schemas.microsoft.com/office/2006/metadata/contentType" xmlns:ma="http://schemas.microsoft.com/office/2006/metadata/properties/metaAttributes" ct:_="" ma:_="" ma:contentTypeName="Document" ma:contentTypeID="0x0101008A3DB1C6C8F67747990693DFDA163C9A" ma:contentTypeVersion="0" ma:contentTypeDescription="Create a new document." ma:contentTypeScope="" ma:versionID="c53e8d4c718320ba5c01db3429b48e01">
   <xsd:schema xmlns:xsd="http://www.w3.org/2001/XMLSchema" xmlns:xs="http://www.w3.org/2001/XMLSchema" xmlns:p="http://schemas.microsoft.com/office/2006/metadata/properties" xmlns:ns1="http://schemas.microsoft.com/sharepoint/v3" xmlns:ns2="C6B13D8A-F6C8-4777-9906-93DFDA163C9A" targetNamespace="http://schemas.microsoft.com/office/2006/metadata/properties" ma:root="true" ma:fieldsID="10d7d5cf4be4c05f12ebb16474ba6c35" ns1:_="" ns2:_="">
     <xsd:import namespace="http://schemas.microsoft.com/sharepoint/v3"/>
@@ -22150,46 +22205,10 @@
 </ct:contentTypeSchema>
 </file>
 
-<file path=customXml/item2.xml><?xml version="1.0" encoding="utf-8"?>
-<p:properties xmlns:p="http://schemas.microsoft.com/office/2006/metadata/properties" xmlns:xsi="http://www.w3.org/2001/XMLSchema-instance" xmlns:pc="http://schemas.microsoft.com/office/infopath/2007/PartnerControls">
-  <documentManagement>
-    <TemplateUrl xmlns="http://schemas.microsoft.com/sharepoint/v3" xsi:nil="true"/>
-    <_SourceUrl xmlns="http://schemas.microsoft.com/sharepoint/v3" xsi:nil="true"/>
-    <Comments0 xmlns="C6B13D8A-F6C8-4777-9906-93DFDA163C9A" xsi:nil="true"/>
-    <xd_ProgID xmlns="http://schemas.microsoft.com/sharepoint/v3" xsi:nil="true"/>
-    <test xmlns="C6B13D8A-F6C8-4777-9906-93DFDA163C9A" xsi:nil="true"/>
-    <Order xmlns="http://schemas.microsoft.com/sharepoint/v3" xsi:nil="true"/>
-    <_SharedFileIndex xmlns="http://schemas.microsoft.com/sharepoint/v3" xsi:nil="true"/>
-    <MetaInfo xmlns="http://schemas.microsoft.com/sharepoint/v3" xsi:nil="true"/>
-    <ContentTypeId xmlns="http://schemas.microsoft.com/sharepoint/v3">0x0101008A3DB1C6C8F67747990693DFDA163C9A</ContentTypeId>
-  </documentManagement>
-</p:properties>
-</file>
-
-<file path=customXml/item3.xml><?xml version="1.0" encoding="utf-8"?>
-<?mso-contentType ?>
-<FormTemplates xmlns="http://schemas.microsoft.com/sharepoint/v3/contenttype/forms">
-  <Display>DocumentLibraryForm</Display>
-  <Edit>DocumentLibraryForm</Edit>
-  <New>DocumentLibraryForm</New>
-</FormTemplates>
-</file>
-
 <file path=customXml/itemProps1.xml><?xml version="1.0" encoding="utf-8"?>
-<ds:datastoreItem xmlns:ds="http://schemas.openxmlformats.org/officeDocument/2006/customXml" ds:itemID="{CC4C9FB6-25E4-4D1F-A1E8-D3497EBEE75E}">
+<ds:datastoreItem xmlns:ds="http://schemas.openxmlformats.org/officeDocument/2006/customXml" ds:itemID="{6268566E-43AA-4A68-BD58-84AB4DF5B82A}">
   <ds:schemaRefs>
-    <ds:schemaRef ds:uri="http://schemas.microsoft.com/office/2006/metadata/contentType"/>
-    <ds:schemaRef ds:uri="http://schemas.microsoft.com/office/2006/metadata/properties/metaAttributes"/>
-    <ds:schemaRef ds:uri="http://www.w3.org/2001/XMLSchema"/>
-    <ds:schemaRef ds:uri="http://schemas.microsoft.com/office/2006/metadata/properties"/>
-    <ds:schemaRef ds:uri="http://schemas.microsoft.com/sharepoint/v3"/>
-    <ds:schemaRef ds:uri="C6B13D8A-F6C8-4777-9906-93DFDA163C9A"/>
-    <ds:schemaRef ds:uri="http://schemas.microsoft.com/office/2006/documentManagement/types"/>
-    <ds:schemaRef ds:uri="http://schemas.microsoft.com/office/infopath/2007/PartnerControls"/>
-    <ds:schemaRef ds:uri="http://schemas.openxmlformats.org/package/2006/metadata/core-properties"/>
-    <ds:schemaRef ds:uri="http://purl.org/dc/elements/1.1/"/>
-    <ds:schemaRef ds:uri="http://purl.org/dc/terms/"/>
-    <ds:schemaRef ds:uri="http://schemas.microsoft.com/internal/obd"/>
+    <ds:schemaRef ds:uri="http://schemas.microsoft.com/sharepoint/v3/contenttype/forms"/>
   </ds:schemaRefs>
 </ds:datastoreItem>
 </file>
@@ -22212,9 +22231,20 @@
 </file>
 
 <file path=customXml/itemProps3.xml><?xml version="1.0" encoding="utf-8"?>
-<ds:datastoreItem xmlns:ds="http://schemas.openxmlformats.org/officeDocument/2006/customXml" ds:itemID="{6268566E-43AA-4A68-BD58-84AB4DF5B82A}">
+<ds:datastoreItem xmlns:ds="http://schemas.openxmlformats.org/officeDocument/2006/customXml" ds:itemID="{CC4C9FB6-25E4-4D1F-A1E8-D3497EBEE75E}">
   <ds:schemaRefs>
-    <ds:schemaRef ds:uri="http://schemas.microsoft.com/sharepoint/v3/contenttype/forms"/>
+    <ds:schemaRef ds:uri="http://schemas.microsoft.com/office/2006/metadata/contentType"/>
+    <ds:schemaRef ds:uri="http://schemas.microsoft.com/office/2006/metadata/properties/metaAttributes"/>
+    <ds:schemaRef ds:uri="http://www.w3.org/2001/XMLSchema"/>
+    <ds:schemaRef ds:uri="http://schemas.microsoft.com/office/2006/metadata/properties"/>
+    <ds:schemaRef ds:uri="http://schemas.microsoft.com/sharepoint/v3"/>
+    <ds:schemaRef ds:uri="C6B13D8A-F6C8-4777-9906-93DFDA163C9A"/>
+    <ds:schemaRef ds:uri="http://schemas.microsoft.com/office/2006/documentManagement/types"/>
+    <ds:schemaRef ds:uri="http://schemas.microsoft.com/office/infopath/2007/PartnerControls"/>
+    <ds:schemaRef ds:uri="http://schemas.openxmlformats.org/package/2006/metadata/core-properties"/>
+    <ds:schemaRef ds:uri="http://purl.org/dc/elements/1.1/"/>
+    <ds:schemaRef ds:uri="http://purl.org/dc/terms/"/>
+    <ds:schemaRef ds:uri="http://schemas.microsoft.com/internal/obd"/>
   </ds:schemaRefs>
 </ds:datastoreItem>
 </file>
</xml_diff>